<commit_message>
Design updates and images
</commit_message>
<xml_diff>
--- a/Design/UIDesign/guess.pptx
+++ b/Design/UIDesign/guess.pptx
@@ -243,7 +243,7 @@
           <a:p>
             <a:fld id="{DC9AFC99-8CBA-4602-827C-86159FB432DE}" type="datetimeFigureOut">
               <a:rPr lang="en-GB" smtClean="0"/>
-              <a:t>31/03/2017</a:t>
+              <a:t>01/05/2017</a:t>
             </a:fld>
             <a:endParaRPr lang="en-GB"/>
           </a:p>
@@ -413,7 +413,7 @@
           <a:p>
             <a:fld id="{DC9AFC99-8CBA-4602-827C-86159FB432DE}" type="datetimeFigureOut">
               <a:rPr lang="en-GB" smtClean="0"/>
-              <a:t>31/03/2017</a:t>
+              <a:t>01/05/2017</a:t>
             </a:fld>
             <a:endParaRPr lang="en-GB"/>
           </a:p>
@@ -593,7 +593,7 @@
           <a:p>
             <a:fld id="{DC9AFC99-8CBA-4602-827C-86159FB432DE}" type="datetimeFigureOut">
               <a:rPr lang="en-GB" smtClean="0"/>
-              <a:t>31/03/2017</a:t>
+              <a:t>01/05/2017</a:t>
             </a:fld>
             <a:endParaRPr lang="en-GB"/>
           </a:p>
@@ -763,7 +763,7 @@
           <a:p>
             <a:fld id="{DC9AFC99-8CBA-4602-827C-86159FB432DE}" type="datetimeFigureOut">
               <a:rPr lang="en-GB" smtClean="0"/>
-              <a:t>31/03/2017</a:t>
+              <a:t>01/05/2017</a:t>
             </a:fld>
             <a:endParaRPr lang="en-GB"/>
           </a:p>
@@ -1009,7 +1009,7 @@
           <a:p>
             <a:fld id="{DC9AFC99-8CBA-4602-827C-86159FB432DE}" type="datetimeFigureOut">
               <a:rPr lang="en-GB" smtClean="0"/>
-              <a:t>31/03/2017</a:t>
+              <a:t>01/05/2017</a:t>
             </a:fld>
             <a:endParaRPr lang="en-GB"/>
           </a:p>
@@ -1241,7 +1241,7 @@
           <a:p>
             <a:fld id="{DC9AFC99-8CBA-4602-827C-86159FB432DE}" type="datetimeFigureOut">
               <a:rPr lang="en-GB" smtClean="0"/>
-              <a:t>31/03/2017</a:t>
+              <a:t>01/05/2017</a:t>
             </a:fld>
             <a:endParaRPr lang="en-GB"/>
           </a:p>
@@ -1608,7 +1608,7 @@
           <a:p>
             <a:fld id="{DC9AFC99-8CBA-4602-827C-86159FB432DE}" type="datetimeFigureOut">
               <a:rPr lang="en-GB" smtClean="0"/>
-              <a:t>31/03/2017</a:t>
+              <a:t>01/05/2017</a:t>
             </a:fld>
             <a:endParaRPr lang="en-GB"/>
           </a:p>
@@ -1726,7 +1726,7 @@
           <a:p>
             <a:fld id="{DC9AFC99-8CBA-4602-827C-86159FB432DE}" type="datetimeFigureOut">
               <a:rPr lang="en-GB" smtClean="0"/>
-              <a:t>31/03/2017</a:t>
+              <a:t>01/05/2017</a:t>
             </a:fld>
             <a:endParaRPr lang="en-GB"/>
           </a:p>
@@ -1821,7 +1821,7 @@
           <a:p>
             <a:fld id="{DC9AFC99-8CBA-4602-827C-86159FB432DE}" type="datetimeFigureOut">
               <a:rPr lang="en-GB" smtClean="0"/>
-              <a:t>31/03/2017</a:t>
+              <a:t>01/05/2017</a:t>
             </a:fld>
             <a:endParaRPr lang="en-GB"/>
           </a:p>
@@ -2098,7 +2098,7 @@
           <a:p>
             <a:fld id="{DC9AFC99-8CBA-4602-827C-86159FB432DE}" type="datetimeFigureOut">
               <a:rPr lang="en-GB" smtClean="0"/>
-              <a:t>31/03/2017</a:t>
+              <a:t>01/05/2017</a:t>
             </a:fld>
             <a:endParaRPr lang="en-GB"/>
           </a:p>
@@ -2351,7 +2351,7 @@
           <a:p>
             <a:fld id="{DC9AFC99-8CBA-4602-827C-86159FB432DE}" type="datetimeFigureOut">
               <a:rPr lang="en-GB" smtClean="0"/>
-              <a:t>31/03/2017</a:t>
+              <a:t>01/05/2017</a:t>
             </a:fld>
             <a:endParaRPr lang="en-GB"/>
           </a:p>
@@ -2564,7 +2564,7 @@
           <a:p>
             <a:fld id="{DC9AFC99-8CBA-4602-827C-86159FB432DE}" type="datetimeFigureOut">
               <a:rPr lang="en-GB" smtClean="0"/>
-              <a:t>31/03/2017</a:t>
+              <a:t>01/05/2017</a:t>
             </a:fld>
             <a:endParaRPr lang="en-GB"/>
           </a:p>
@@ -3030,7 +3030,7 @@
         </p:nvSpPr>
         <p:spPr>
           <a:xfrm>
-            <a:off x="139815" y="1028953"/>
+            <a:off x="3837393" y="1050527"/>
             <a:ext cx="4580389" cy="2062103"/>
           </a:xfrm>
           <a:prstGeom prst="rect">
@@ -3044,6 +3044,7 @@
           </a:bodyPr>
           <a:lstStyle/>
           <a:p>
+            <a:pPr algn="ctr"/>
             <a:r>
               <a:rPr lang="en-GB" sz="3200" dirty="0">
                 <a:solidFill>
@@ -3054,6 +3055,7 @@
             </a:r>
           </a:p>
           <a:p>
+            <a:pPr algn="ctr"/>
             <a:r>
               <a:rPr lang="en-GB" sz="3200" dirty="0">
                 <a:solidFill>
@@ -3064,6 +3066,7 @@
             </a:r>
           </a:p>
           <a:p>
+            <a:pPr algn="ctr"/>
             <a:r>
               <a:rPr lang="en-GB" sz="3200" dirty="0">
                 <a:solidFill>
@@ -3074,11 +3077,15 @@
             </a:r>
           </a:p>
           <a:p>
-            <a:endParaRPr lang="en-GB" sz="3200" dirty="0">
-              <a:solidFill>
-                <a:schemeClr val="bg1"/>
-              </a:solidFill>
-            </a:endParaRPr>
+            <a:pPr algn="ctr"/>
+            <a:r>
+              <a:rPr lang="en-GB" sz="3200" dirty="0">
+                <a:solidFill>
+                  <a:schemeClr val="bg1"/>
+                </a:solidFill>
+              </a:rPr>
+              <a:t>Current Score: 25</a:t>
+            </a:r>
           </a:p>
         </p:txBody>
       </p:sp>
@@ -3090,7 +3097,7 @@
         </p:nvSpPr>
         <p:spPr>
           <a:xfrm>
-            <a:off x="2975294" y="4084865"/>
+            <a:off x="2975294" y="4772763"/>
             <a:ext cx="6241408" cy="418051"/>
           </a:xfrm>
           <a:prstGeom prst="rect">
@@ -3250,7 +3257,7 @@
         </p:nvSpPr>
         <p:spPr>
           <a:xfrm>
-            <a:off x="3400425" y="2863850"/>
+            <a:off x="3400425" y="3568526"/>
             <a:ext cx="5454327" cy="584775"/>
           </a:xfrm>
           <a:prstGeom prst="rect">
@@ -3264,29 +3271,14 @@
           </a:bodyPr>
           <a:lstStyle/>
           <a:p>
+            <a:pPr algn="ctr"/>
             <a:r>
               <a:rPr lang="en-GB" sz="3200" dirty="0">
                 <a:solidFill>
                   <a:schemeClr val="bg1"/>
                 </a:solidFill>
               </a:rPr>
-              <a:t>	        </a:t>
-            </a:r>
-            <a:r>
-              <a:rPr lang="en-GB" sz="3200" dirty="0">
-                <a:solidFill>
-                  <a:srgbClr val="FFFF00"/>
-                </a:solidFill>
-              </a:rPr>
-              <a:t>? ? ? ?  </a:t>
-            </a:r>
-            <a:r>
-              <a:rPr lang="en-GB" sz="3200" dirty="0">
-                <a:solidFill>
-                  <a:schemeClr val="bg1"/>
-                </a:solidFill>
-              </a:rPr>
-              <a:t>Put</a:t>
+              <a:t>_ _ _ _     Put</a:t>
             </a:r>
             <a:endParaRPr lang="en-GB" dirty="0">
               <a:solidFill>

</xml_diff>